<commit_message>
Update the dev guide with rough implementation of markdone and transaction command
</commit_message>
<xml_diff>
--- a/docs/images/diagrams - Copy.pptx
+++ b/docs/images/diagrams - Copy.pptx
@@ -8660,7 +8660,7 @@
         <p:spPr>
           <a:xfrm>
             <a:off x="5546271" y="2195342"/>
-            <a:ext cx="1324303" cy="386255"/>
+            <a:ext cx="1363513" cy="386255"/>
           </a:xfrm>
           <a:prstGeom prst="rect">
             <a:avLst/>
@@ -8702,7 +8702,7 @@
               <a:t>:</a:t>
             </a:r>
             <a:r>
-              <a:rPr lang="en-US" sz="1050" dirty="0" err="1">
+              <a:rPr lang="en-US" sz="1050" dirty="0">
                 <a:solidFill>
                   <a:schemeClr val="tx1"/>
                 </a:solidFill>
@@ -8774,7 +8774,7 @@
               <a:t>:</a:t>
             </a:r>
             <a:r>
-              <a:rPr lang="en-US" sz="1400">
+              <a:rPr lang="en-US" sz="1400" dirty="0" err="1">
                 <a:solidFill>
                   <a:schemeClr val="tx1"/>
                 </a:solidFill>

</xml_diff>